<commit_message>
Update Presentación de Mercado inmobiliario en Caba.pptx
</commit_message>
<xml_diff>
--- a/Presentación de Mercado inmobiliario en Caba.pptx
+++ b/Presentación de Mercado inmobiliario en Caba.pptx
@@ -3496,8 +3496,8 @@
     </dgm:pt>
   </dgm:ptLst>
   <dgm:cxnLst>
+    <dgm:cxn modelId="{F8D08460-C535-44F7-A621-C71ED8D28160}" type="presOf" srcId="{5530A5F5-7002-4B17-B142-4F1F3023A26B}" destId="{FBCE6818-CF6A-4F20-8316-5DA521646453}" srcOrd="0" destOrd="0" presId="urn:microsoft.com/office/officeart/2005/8/layout/hierarchy1"/>
     <dgm:cxn modelId="{29525957-2BE9-4591-B21A-845C560E407B}" srcId="{73BAA17D-A05F-49D3-9962-FAA451D0017B}" destId="{EE5E902D-2C8A-4A8A-8F37-C7EE449C7A7D}" srcOrd="0" destOrd="0" parTransId="{8F3BD37F-3F62-4F08-834C-69F5C6FE0557}" sibTransId="{0C53FBD7-9804-4714-8217-D4BCCEA7EAFB}"/>
-    <dgm:cxn modelId="{F8D08460-C535-44F7-A621-C71ED8D28160}" type="presOf" srcId="{5530A5F5-7002-4B17-B142-4F1F3023A26B}" destId="{FBCE6818-CF6A-4F20-8316-5DA521646453}" srcOrd="0" destOrd="0" presId="urn:microsoft.com/office/officeart/2005/8/layout/hierarchy1"/>
     <dgm:cxn modelId="{A383A1A5-8703-41FB-9F7D-A7F49B57527A}" srcId="{73BAA17D-A05F-49D3-9962-FAA451D0017B}" destId="{5530A5F5-7002-4B17-B142-4F1F3023A26B}" srcOrd="1" destOrd="0" parTransId="{BFBD8825-55B1-463E-8D69-12F184B7767F}" sibTransId="{A7713C44-7CD1-4741-BDE4-6A04823B2E3E}"/>
     <dgm:cxn modelId="{5152D1A7-17EC-4354-BC27-BC1E49B2198B}" type="presOf" srcId="{EE5E902D-2C8A-4A8A-8F37-C7EE449C7A7D}" destId="{D6FEB8D3-E3EC-49C6-8781-C8B870492447}" srcOrd="0" destOrd="0" presId="urn:microsoft.com/office/officeart/2005/8/layout/hierarchy1"/>
     <dgm:cxn modelId="{359B9BD9-86CC-4D7A-89BA-E0616D6063B4}" type="presOf" srcId="{73BAA17D-A05F-49D3-9962-FAA451D0017B}" destId="{FAFC6929-D22F-4BC4-801D-FF89C2ED10A5}" srcOrd="0" destOrd="0" presId="urn:microsoft.com/office/officeart/2005/8/layout/hierarchy1"/>
@@ -3810,8 +3810,8 @@
   <dgm:cxnLst>
     <dgm:cxn modelId="{975B200C-B69E-43EF-9162-2C24D8DA7170}" srcId="{77E91281-3A19-4C92-809F-4C64F220D1A4}" destId="{D8731588-92A1-447A-A92B-D1D4D0B424BC}" srcOrd="4" destOrd="0" parTransId="{9C25821F-1815-46D5-A890-8824341401CB}" sibTransId="{DE26BA56-770B-4110-955C-540CDD261D82}"/>
     <dgm:cxn modelId="{CE1EA422-5769-4344-8C9A-B4E9EB620D1D}" type="presOf" srcId="{532FF33C-D150-4101-A5BC-939E59ABE9AB}" destId="{FA637D3A-4025-47D3-9432-AD1F23901D7D}" srcOrd="0" destOrd="0" presId="urn:microsoft.com/office/officeart/2008/layout/LinedList"/>
+    <dgm:cxn modelId="{8B5D2B67-2477-441C-B00D-71D80D4D78C7}" type="presOf" srcId="{9CA4CF4B-AE66-40E5-A3A3-C4B7C9D8F68C}" destId="{8424524D-9FFA-448A-AFD4-9406704234AA}" srcOrd="0" destOrd="0" presId="urn:microsoft.com/office/officeart/2008/layout/LinedList"/>
     <dgm:cxn modelId="{FB372552-9089-41A0-974B-ED99501E85F8}" srcId="{77E91281-3A19-4C92-809F-4C64F220D1A4}" destId="{F22A6AA2-D02B-4D55-8006-91FACF206C8C}" srcOrd="2" destOrd="0" parTransId="{4D045A28-152A-403E-86F0-1E2C0758D3D3}" sibTransId="{6611F778-C080-4EBB-8E72-A93DC923DAB7}"/>
-    <dgm:cxn modelId="{8B5D2B67-2477-441C-B00D-71D80D4D78C7}" type="presOf" srcId="{9CA4CF4B-AE66-40E5-A3A3-C4B7C9D8F68C}" destId="{8424524D-9FFA-448A-AFD4-9406704234AA}" srcOrd="0" destOrd="0" presId="urn:microsoft.com/office/officeart/2008/layout/LinedList"/>
     <dgm:cxn modelId="{84F4F889-986D-4DFB-8374-953B94D3D3DA}" srcId="{77E91281-3A19-4C92-809F-4C64F220D1A4}" destId="{3FD06BA1-CE2C-44A8-870F-04089A5CADAF}" srcOrd="3" destOrd="0" parTransId="{94D6CEE4-6A22-40D8-B711-4197987B75B7}" sibTransId="{8187A9D9-3CF4-48D4-A7DF-E3422A0F7EFC}"/>
     <dgm:cxn modelId="{BCB3E293-B622-407B-8F5A-7496CFCC5C52}" srcId="{77E91281-3A19-4C92-809F-4C64F220D1A4}" destId="{532FF33C-D150-4101-A5BC-939E59ABE9AB}" srcOrd="0" destOrd="0" parTransId="{C8362536-470B-4F39-A4A4-6C81D8C4E36D}" sibTransId="{27ED18A8-50CE-4429-A327-A73FB1008791}"/>
     <dgm:cxn modelId="{E3CB0C9E-0F1B-4929-8865-555C3D9BFB42}" type="presOf" srcId="{D8731588-92A1-447A-A92B-D1D4D0B424BC}" destId="{04EE6C7B-A062-4793-8989-4FAFB9F88B45}" srcOrd="0" destOrd="0" presId="urn:microsoft.com/office/officeart/2008/layout/LinedList"/>
@@ -4538,9 +4538,9 @@
     <dgm:cxn modelId="{9D54AE29-0C17-47A7-B930-3177DB406D33}" srcId="{4A22B584-66FD-4686-8BAD-986A4CE728D8}" destId="{C93C26C1-AAE5-4CE3-B8C2-96ABB79422F5}" srcOrd="2" destOrd="0" parTransId="{A6B9407A-B447-4290-A485-67ECFECF3695}" sibTransId="{56A12124-B526-4701-BC38-7AF252BB9831}"/>
     <dgm:cxn modelId="{67787F30-152F-492F-830D-64A31B47D96C}" type="presOf" srcId="{C93C26C1-AAE5-4CE3-B8C2-96ABB79422F5}" destId="{414BB1A1-DA25-4429-A49E-BEFA4B112817}" srcOrd="0" destOrd="0" presId="urn:microsoft.com/office/officeart/2016/7/layout/BasicLinearProcessNumbered"/>
     <dgm:cxn modelId="{9F65AB31-11FA-47E0-934E-5E7C9F466A3E}" srcId="{4A22B584-66FD-4686-8BAD-986A4CE728D8}" destId="{06FA9B52-C8C6-4ED5-8912-48A41A86CD01}" srcOrd="3" destOrd="0" parTransId="{26F53B6F-A993-4BC1-8495-2838F56E125F}" sibTransId="{AADEC645-1010-4A86-B108-CEF00682EB67}"/>
-    <dgm:cxn modelId="{CEF36B56-B108-4890-9AD8-216333212C83}" type="presOf" srcId="{06FA9B52-C8C6-4ED5-8912-48A41A86CD01}" destId="{06A1E8CF-31BC-4655-8479-5DE76C20EE24}" srcOrd="0" destOrd="0" presId="urn:microsoft.com/office/officeart/2016/7/layout/BasicLinearProcessNumbered"/>
     <dgm:cxn modelId="{3A303C67-696D-4702-9192-97E6F9B99FCC}" type="presOf" srcId="{7601FFD1-8CF0-427E-8AB6-E40341815E3F}" destId="{4D5EF78F-CD1D-4B60-874F-AB352EBD42C8}" srcOrd="1" destOrd="0" presId="urn:microsoft.com/office/officeart/2016/7/layout/BasicLinearProcessNumbered"/>
     <dgm:cxn modelId="{093DCD70-31E8-45AD-86C7-BF2954191D23}" type="presOf" srcId="{06FA9B52-C8C6-4ED5-8912-48A41A86CD01}" destId="{57F29EE7-6948-4F12-AB32-468119A3FB7C}" srcOrd="1" destOrd="0" presId="urn:microsoft.com/office/officeart/2016/7/layout/BasicLinearProcessNumbered"/>
+    <dgm:cxn modelId="{CEF36B56-B108-4890-9AD8-216333212C83}" type="presOf" srcId="{06FA9B52-C8C6-4ED5-8912-48A41A86CD01}" destId="{06A1E8CF-31BC-4655-8479-5DE76C20EE24}" srcOrd="0" destOrd="0" presId="urn:microsoft.com/office/officeart/2016/7/layout/BasicLinearProcessNumbered"/>
     <dgm:cxn modelId="{D8A5E081-3167-489F-8856-AD6D5228A29E}" type="presOf" srcId="{7601FFD1-8CF0-427E-8AB6-E40341815E3F}" destId="{33E38DB8-9F01-4086-81BC-8BDECAD5B7BE}" srcOrd="0" destOrd="0" presId="urn:microsoft.com/office/officeart/2016/7/layout/BasicLinearProcessNumbered"/>
     <dgm:cxn modelId="{C1405584-8504-4CDA-9E9E-039AC3F294C8}" type="presOf" srcId="{17954226-B9CE-4AEF-BA39-214D37E4FF5A}" destId="{D1ABC675-6142-4D54-9516-B5B15B6EE9D7}" srcOrd="1" destOrd="0" presId="urn:microsoft.com/office/officeart/2016/7/layout/BasicLinearProcessNumbered"/>
     <dgm:cxn modelId="{B2313F8D-0066-456C-B27E-C7005470D809}" type="presOf" srcId="{4A22B584-66FD-4686-8BAD-986A4CE728D8}" destId="{F8820452-929C-45E9-A108-FD83EB36AF5E}" srcOrd="0" destOrd="0" presId="urn:microsoft.com/office/officeart/2016/7/layout/BasicLinearProcessNumbered"/>
@@ -6166,7 +6166,7 @@
         </a:prstGeom>
         <a:solidFill>
           <a:schemeClr val="accent2">
-            <a:hueOff val="668789"/>
+            <a:hueOff val="668788"/>
             <a:satOff val="-834"/>
             <a:lumOff val="196"/>
             <a:alphaOff val="0"/>
@@ -6175,7 +6175,7 @@
         <a:ln w="25400" cap="flat" cmpd="sng" algn="ctr">
           <a:solidFill>
             <a:schemeClr val="accent2">
-              <a:hueOff val="668789"/>
+              <a:hueOff val="668788"/>
               <a:satOff val="-834"/>
               <a:lumOff val="196"/>
               <a:alphaOff val="0"/>
@@ -6419,7 +6419,7 @@
         </a:prstGeom>
         <a:solidFill>
           <a:schemeClr val="accent2">
-            <a:hueOff val="2006366"/>
+            <a:hueOff val="2006365"/>
             <a:satOff val="-2502"/>
             <a:lumOff val="588"/>
             <a:alphaOff val="0"/>
@@ -6428,7 +6428,7 @@
         <a:ln w="25400" cap="flat" cmpd="sng" algn="ctr">
           <a:solidFill>
             <a:schemeClr val="accent2">
-              <a:hueOff val="2006366"/>
+              <a:hueOff val="2006365"/>
               <a:satOff val="-2502"/>
               <a:lumOff val="588"/>
               <a:alphaOff val="0"/>
@@ -6624,7 +6624,7 @@
         </a:prstGeom>
         <a:solidFill>
           <a:schemeClr val="accent2">
-            <a:hueOff val="3343943"/>
+            <a:hueOff val="3343942"/>
             <a:satOff val="-4171"/>
             <a:lumOff val="981"/>
             <a:alphaOff val="0"/>
@@ -6633,7 +6633,7 @@
         <a:ln w="25400" cap="flat" cmpd="sng" algn="ctr">
           <a:solidFill>
             <a:schemeClr val="accent2">
-              <a:hueOff val="3343943"/>
+              <a:hueOff val="3343942"/>
               <a:satOff val="-4171"/>
               <a:lumOff val="981"/>
               <a:alphaOff val="0"/>
@@ -6829,7 +6829,7 @@
         </a:prstGeom>
         <a:solidFill>
           <a:schemeClr val="accent2">
-            <a:hueOff val="4681520"/>
+            <a:hueOff val="4681519"/>
             <a:satOff val="-5839"/>
             <a:lumOff val="1373"/>
             <a:alphaOff val="0"/>
@@ -6838,7 +6838,7 @@
         <a:ln w="25400" cap="flat" cmpd="sng" algn="ctr">
           <a:solidFill>
             <a:schemeClr val="accent2">
-              <a:hueOff val="4681520"/>
+              <a:hueOff val="4681519"/>
               <a:satOff val="-5839"/>
               <a:lumOff val="1373"/>
               <a:alphaOff val="0"/>
@@ -13714,7 +13714,7 @@
           <a:p>
             <a:fld id="{5BCAD085-E8A6-8845-BD4E-CB4CCA059FC4}" type="datetimeFigureOut">
               <a:rPr lang="en-US" smtClean="0"/>
-              <a:t>7/5/25</a:t>
+              <a:t>7/6/2025</a:t>
             </a:fld>
             <a:endParaRPr lang="en-US"/>
           </a:p>
@@ -13882,7 +13882,7 @@
           <a:p>
             <a:fld id="{5BCAD085-E8A6-8845-BD4E-CB4CCA059FC4}" type="datetimeFigureOut">
               <a:rPr lang="en-US" smtClean="0"/>
-              <a:t>7/5/25</a:t>
+              <a:t>7/6/2025</a:t>
             </a:fld>
             <a:endParaRPr lang="en-US"/>
           </a:p>
@@ -14060,7 +14060,7 @@
           <a:p>
             <a:fld id="{5BCAD085-E8A6-8845-BD4E-CB4CCA059FC4}" type="datetimeFigureOut">
               <a:rPr lang="en-US" smtClean="0"/>
-              <a:t>7/5/25</a:t>
+              <a:t>7/6/2025</a:t>
             </a:fld>
             <a:endParaRPr lang="en-US"/>
           </a:p>
@@ -14228,7 +14228,7 @@
           <a:p>
             <a:fld id="{5BCAD085-E8A6-8845-BD4E-CB4CCA059FC4}" type="datetimeFigureOut">
               <a:rPr lang="en-US" smtClean="0"/>
-              <a:t>7/5/25</a:t>
+              <a:t>7/6/2025</a:t>
             </a:fld>
             <a:endParaRPr lang="en-US"/>
           </a:p>
@@ -14473,7 +14473,7 @@
           <a:p>
             <a:fld id="{5BCAD085-E8A6-8845-BD4E-CB4CCA059FC4}" type="datetimeFigureOut">
               <a:rPr lang="en-US" smtClean="0"/>
-              <a:t>7/5/25</a:t>
+              <a:t>7/6/2025</a:t>
             </a:fld>
             <a:endParaRPr lang="en-US"/>
           </a:p>
@@ -14758,7 +14758,7 @@
           <a:p>
             <a:fld id="{5BCAD085-E8A6-8845-BD4E-CB4CCA059FC4}" type="datetimeFigureOut">
               <a:rPr lang="en-US" smtClean="0"/>
-              <a:t>7/5/25</a:t>
+              <a:t>7/6/2025</a:t>
             </a:fld>
             <a:endParaRPr lang="en-US"/>
           </a:p>
@@ -15177,7 +15177,7 @@
           <a:p>
             <a:fld id="{5BCAD085-E8A6-8845-BD4E-CB4CCA059FC4}" type="datetimeFigureOut">
               <a:rPr lang="en-US" smtClean="0"/>
-              <a:t>7/5/25</a:t>
+              <a:t>7/6/2025</a:t>
             </a:fld>
             <a:endParaRPr lang="en-US"/>
           </a:p>
@@ -15294,7 +15294,7 @@
           <a:p>
             <a:fld id="{5BCAD085-E8A6-8845-BD4E-CB4CCA059FC4}" type="datetimeFigureOut">
               <a:rPr lang="en-US" smtClean="0"/>
-              <a:t>7/5/25</a:t>
+              <a:t>7/6/2025</a:t>
             </a:fld>
             <a:endParaRPr lang="en-US"/>
           </a:p>
@@ -15389,7 +15389,7 @@
           <a:p>
             <a:fld id="{5BCAD085-E8A6-8845-BD4E-CB4CCA059FC4}" type="datetimeFigureOut">
               <a:rPr lang="en-US" smtClean="0"/>
-              <a:t>7/5/25</a:t>
+              <a:t>7/6/2025</a:t>
             </a:fld>
             <a:endParaRPr lang="en-US"/>
           </a:p>
@@ -15664,7 +15664,7 @@
           <a:p>
             <a:fld id="{5BCAD085-E8A6-8845-BD4E-CB4CCA059FC4}" type="datetimeFigureOut">
               <a:rPr lang="en-US" smtClean="0"/>
-              <a:t>7/5/25</a:t>
+              <a:t>7/6/2025</a:t>
             </a:fld>
             <a:endParaRPr lang="en-US"/>
           </a:p>
@@ -15916,7 +15916,7 @@
           <a:p>
             <a:fld id="{5BCAD085-E8A6-8845-BD4E-CB4CCA059FC4}" type="datetimeFigureOut">
               <a:rPr lang="en-US" smtClean="0"/>
-              <a:t>7/5/25</a:t>
+              <a:t>7/6/2025</a:t>
             </a:fld>
             <a:endParaRPr lang="en-US"/>
           </a:p>
@@ -16127,7 +16127,7 @@
           <a:p>
             <a:fld id="{5BCAD085-E8A6-8845-BD4E-CB4CCA059FC4}" type="datetimeFigureOut">
               <a:rPr lang="en-US" smtClean="0"/>
-              <a:t>7/5/25</a:t>
+              <a:t>7/6/2025</a:t>
             </a:fld>
             <a:endParaRPr lang="en-US"/>
           </a:p>
@@ -18903,20 +18903,20 @@
           <a:lstStyle/>
           <a:p>
             <a:r>
-              <a:rPr lang="es-ES" sz="2000"/>
+              <a:rPr lang="es-ES" sz="2000" dirty="0"/>
               <a:t>Trabajo Final – Ciencia de Datos para Economía y Negocios – FCE UBA</a:t>
             </a:r>
           </a:p>
           <a:p>
             <a:r>
-              <a:rPr lang="es-ES" sz="2000"/>
+              <a:rPr lang="es-ES" sz="2000" dirty="0"/>
               <a:t>Integrantes: Evelyn Condori, Ezequiel Fontana, Rafael González</a:t>
             </a:r>
           </a:p>
           <a:p>
             <a:r>
-              <a:rPr lang="es-ES" sz="2000"/>
-              <a:t>Repositorio GitHub: (incluir link o QR en la entrega)</a:t>
+              <a:rPr lang="es-ES" sz="2000" dirty="0"/>
+              <a:t>Repositorio GitHub: https://github.com/rafaelegh02/FCE-trabajo-de-mercado-inmobiliario-</a:t>
             </a:r>
           </a:p>
         </p:txBody>

</xml_diff>